<commit_message>
mid and characterization display add&final upload
</commit_message>
<xml_diff>
--- a/Presntations/Characterization presentation IOT Barcode checker 7681.pptx
+++ b/Presntations/Characterization presentation IOT Barcode checker 7681.pptx
@@ -5,7 +5,7 @@
     <p:sldMasterId id="2147483696" r:id="rId1"/>
   </p:sldMasterIdLst>
   <p:notesMasterIdLst>
-    <p:notesMasterId r:id="rId17"/>
+    <p:notesMasterId r:id="rId18"/>
   </p:notesMasterIdLst>
   <p:sldIdLst>
     <p:sldId id="256" r:id="rId2"/>
@@ -20,9 +20,10 @@
     <p:sldId id="259" r:id="rId11"/>
     <p:sldId id="270" r:id="rId12"/>
     <p:sldId id="275" r:id="rId13"/>
-    <p:sldId id="260" r:id="rId14"/>
-    <p:sldId id="276" r:id="rId15"/>
-    <p:sldId id="278" r:id="rId16"/>
+    <p:sldId id="288" r:id="rId14"/>
+    <p:sldId id="260" r:id="rId15"/>
+    <p:sldId id="276" r:id="rId16"/>
+    <p:sldId id="278" r:id="rId17"/>
   </p:sldIdLst>
   <p:sldSz cx="12192000" cy="6858000"/>
   <p:notesSz cx="6858000" cy="9144000"/>
@@ -11704,7 +11705,7 @@
           <a:p>
             <a:fld id="{A9F116F6-876A-46EC-830D-DE4D9F46346F}" type="datetimeFigureOut">
               <a:rPr lang="en-IL" smtClean="0"/>
-              <a:t>05/08/2024</a:t>
+              <a:t>23/11/2024</a:t>
             </a:fld>
             <a:endParaRPr lang="en-IL"/>
           </a:p>
@@ -12246,7 +12247,7 @@
           <a:noFill/>
           <a:extLst>
             <a:ext uri="{909E8E84-426E-40dd-AFC4-6F175D3DCCD1}">
-              <a14:hiddenFill xmlns="" xmlns:a14="http://schemas.microsoft.com/office/drawing/2010/main">
+              <a14:hiddenFill xmlns:a14="http://schemas.microsoft.com/office/drawing/2010/main" xmlns="">
                 <a:solidFill>
                   <a:srgbClr val="FFFFFF"/>
                 </a:solidFill>
@@ -12306,7 +12307,7 @@
             </a:ln>
             <a:extLst>
               <a:ext uri="{91240B29-F687-4f45-9708-019B960494DF}">
-                <a14:hiddenLine xmlns="" xmlns:a14="http://schemas.microsoft.com/office/drawing/2010/main" w="9525">
+                <a14:hiddenLine xmlns:a14="http://schemas.microsoft.com/office/drawing/2010/main" xmlns="" w="9525">
                   <a:solidFill>
                     <a:srgbClr val="000000"/>
                   </a:solidFill>
@@ -12396,7 +12397,7 @@
             </a:ln>
             <a:extLst>
               <a:ext uri="{91240B29-F687-4f45-9708-019B960494DF}">
-                <a14:hiddenLine xmlns="" xmlns:a14="http://schemas.microsoft.com/office/drawing/2010/main" w="9525">
+                <a14:hiddenLine xmlns:a14="http://schemas.microsoft.com/office/drawing/2010/main" xmlns="" w="9525">
                   <a:solidFill>
                     <a:srgbClr val="000000"/>
                   </a:solidFill>
@@ -12486,7 +12487,7 @@
             </a:ln>
             <a:extLst>
               <a:ext uri="{91240B29-F687-4f45-9708-019B960494DF}">
-                <a14:hiddenLine xmlns="" xmlns:a14="http://schemas.microsoft.com/office/drawing/2010/main" w="9525">
+                <a14:hiddenLine xmlns:a14="http://schemas.microsoft.com/office/drawing/2010/main" xmlns="" w="9525">
                   <a:solidFill>
                     <a:srgbClr val="000000"/>
                   </a:solidFill>
@@ -12520,7 +12521,7 @@
             </a:ln>
             <a:extLst>
               <a:ext uri="{91240B29-F687-4f45-9708-019B960494DF}">
-                <a14:hiddenLine xmlns="" xmlns:a14="http://schemas.microsoft.com/office/drawing/2010/main" w="9525">
+                <a14:hiddenLine xmlns:a14="http://schemas.microsoft.com/office/drawing/2010/main" xmlns="" w="9525">
                   <a:solidFill>
                     <a:srgbClr val="000000"/>
                   </a:solidFill>
@@ -12610,7 +12611,7 @@
             </a:ln>
             <a:extLst>
               <a:ext uri="{91240B29-F687-4f45-9708-019B960494DF}">
-                <a14:hiddenLine xmlns="" xmlns:a14="http://schemas.microsoft.com/office/drawing/2010/main" w="9525">
+                <a14:hiddenLine xmlns:a14="http://schemas.microsoft.com/office/drawing/2010/main" xmlns="" w="9525">
                   <a:solidFill>
                     <a:srgbClr val="000000"/>
                   </a:solidFill>
@@ -12672,7 +12673,7 @@
             </a:ln>
             <a:extLst>
               <a:ext uri="{91240B29-F687-4f45-9708-019B960494DF}">
-                <a14:hiddenLine xmlns="" xmlns:a14="http://schemas.microsoft.com/office/drawing/2010/main" w="9525">
+                <a14:hiddenLine xmlns:a14="http://schemas.microsoft.com/office/drawing/2010/main" xmlns="" w="9525">
                   <a:solidFill>
                     <a:srgbClr val="000000"/>
                   </a:solidFill>
@@ -12734,7 +12735,7 @@
             </a:ln>
             <a:extLst>
               <a:ext uri="{91240B29-F687-4f45-9708-019B960494DF}">
-                <a14:hiddenLine xmlns="" xmlns:a14="http://schemas.microsoft.com/office/drawing/2010/main" w="9525">
+                <a14:hiddenLine xmlns:a14="http://schemas.microsoft.com/office/drawing/2010/main" xmlns="" w="9525">
                   <a:solidFill>
                     <a:srgbClr val="000000"/>
                   </a:solidFill>
@@ -12824,7 +12825,7 @@
             </a:ln>
             <a:extLst>
               <a:ext uri="{91240B29-F687-4f45-9708-019B960494DF}">
-                <a14:hiddenLine xmlns="" xmlns:a14="http://schemas.microsoft.com/office/drawing/2010/main" w="9525">
+                <a14:hiddenLine xmlns:a14="http://schemas.microsoft.com/office/drawing/2010/main" xmlns="" w="9525">
                   <a:solidFill>
                     <a:srgbClr val="000000"/>
                   </a:solidFill>
@@ -12886,7 +12887,7 @@
             </a:ln>
             <a:extLst>
               <a:ext uri="{91240B29-F687-4f45-9708-019B960494DF}">
-                <a14:hiddenLine xmlns="" xmlns:a14="http://schemas.microsoft.com/office/drawing/2010/main" w="9525">
+                <a14:hiddenLine xmlns:a14="http://schemas.microsoft.com/office/drawing/2010/main" xmlns="" w="9525">
                   <a:solidFill>
                     <a:srgbClr val="000000"/>
                   </a:solidFill>
@@ -12948,7 +12949,7 @@
             </a:ln>
             <a:extLst>
               <a:ext uri="{91240B29-F687-4f45-9708-019B960494DF}">
-                <a14:hiddenLine xmlns="" xmlns:a14="http://schemas.microsoft.com/office/drawing/2010/main" w="9525">
+                <a14:hiddenLine xmlns:a14="http://schemas.microsoft.com/office/drawing/2010/main" xmlns="" w="9525">
                   <a:solidFill>
                     <a:srgbClr val="000000"/>
                   </a:solidFill>
@@ -13038,7 +13039,7 @@
             </a:ln>
             <a:extLst>
               <a:ext uri="{91240B29-F687-4f45-9708-019B960494DF}">
-                <a14:hiddenLine xmlns="" xmlns:a14="http://schemas.microsoft.com/office/drawing/2010/main" w="9525">
+                <a14:hiddenLine xmlns:a14="http://schemas.microsoft.com/office/drawing/2010/main" xmlns="" w="9525">
                   <a:solidFill>
                     <a:srgbClr val="000000"/>
                   </a:solidFill>
@@ -13128,7 +13129,7 @@
             </a:ln>
             <a:extLst>
               <a:ext uri="{91240B29-F687-4f45-9708-019B960494DF}">
-                <a14:hiddenLine xmlns="" xmlns:a14="http://schemas.microsoft.com/office/drawing/2010/main" w="9525">
+                <a14:hiddenLine xmlns:a14="http://schemas.microsoft.com/office/drawing/2010/main" xmlns="" w="9525">
                   <a:solidFill>
                     <a:srgbClr val="000000"/>
                   </a:solidFill>
@@ -13190,7 +13191,7 @@
             </a:ln>
             <a:extLst>
               <a:ext uri="{91240B29-F687-4f45-9708-019B960494DF}">
-                <a14:hiddenLine xmlns="" xmlns:a14="http://schemas.microsoft.com/office/drawing/2010/main" w="9525">
+                <a14:hiddenLine xmlns:a14="http://schemas.microsoft.com/office/drawing/2010/main" xmlns="" w="9525">
                   <a:solidFill>
                     <a:srgbClr val="000000"/>
                   </a:solidFill>
@@ -13300,7 +13301,7 @@
             </a:ln>
             <a:extLst>
               <a:ext uri="{91240B29-F687-4f45-9708-019B960494DF}">
-                <a14:hiddenLine xmlns="" xmlns:a14="http://schemas.microsoft.com/office/drawing/2010/main" w="9525">
+                <a14:hiddenLine xmlns:a14="http://schemas.microsoft.com/office/drawing/2010/main" xmlns="" w="9525">
                   <a:solidFill>
                     <a:srgbClr val="000000"/>
                   </a:solidFill>
@@ -13362,7 +13363,7 @@
             </a:ln>
             <a:extLst>
               <a:ext uri="{91240B29-F687-4f45-9708-019B960494DF}">
-                <a14:hiddenLine xmlns="" xmlns:a14="http://schemas.microsoft.com/office/drawing/2010/main" w="9525">
+                <a14:hiddenLine xmlns:a14="http://schemas.microsoft.com/office/drawing/2010/main" xmlns="" w="9525">
                   <a:solidFill>
                     <a:srgbClr val="000000"/>
                   </a:solidFill>
@@ -13452,7 +13453,7 @@
             </a:ln>
             <a:extLst>
               <a:ext uri="{91240B29-F687-4f45-9708-019B960494DF}">
-                <a14:hiddenLine xmlns="" xmlns:a14="http://schemas.microsoft.com/office/drawing/2010/main" w="9525">
+                <a14:hiddenLine xmlns:a14="http://schemas.microsoft.com/office/drawing/2010/main" xmlns="" w="9525">
                   <a:solidFill>
                     <a:srgbClr val="000000"/>
                   </a:solidFill>
@@ -13542,7 +13543,7 @@
             </a:ln>
             <a:extLst>
               <a:ext uri="{91240B29-F687-4f45-9708-019B960494DF}">
-                <a14:hiddenLine xmlns="" xmlns:a14="http://schemas.microsoft.com/office/drawing/2010/main" w="9525">
+                <a14:hiddenLine xmlns:a14="http://schemas.microsoft.com/office/drawing/2010/main" xmlns="" w="9525">
                   <a:solidFill>
                     <a:srgbClr val="000000"/>
                   </a:solidFill>
@@ -13604,7 +13605,7 @@
             </a:ln>
             <a:extLst>
               <a:ext uri="{91240B29-F687-4f45-9708-019B960494DF}">
-                <a14:hiddenLine xmlns="" xmlns:a14="http://schemas.microsoft.com/office/drawing/2010/main" w="9525">
+                <a14:hiddenLine xmlns:a14="http://schemas.microsoft.com/office/drawing/2010/main" xmlns="" w="9525">
                   <a:solidFill>
                     <a:srgbClr val="000000"/>
                   </a:solidFill>
@@ -13694,7 +13695,7 @@
             </a:ln>
             <a:extLst>
               <a:ext uri="{91240B29-F687-4f45-9708-019B960494DF}">
-                <a14:hiddenLine xmlns="" xmlns:a14="http://schemas.microsoft.com/office/drawing/2010/main" w="9525">
+                <a14:hiddenLine xmlns:a14="http://schemas.microsoft.com/office/drawing/2010/main" xmlns="" w="9525">
                   <a:solidFill>
                     <a:srgbClr val="000000"/>
                   </a:solidFill>
@@ -13784,7 +13785,7 @@
             </a:ln>
             <a:extLst>
               <a:ext uri="{91240B29-F687-4f45-9708-019B960494DF}">
-                <a14:hiddenLine xmlns="" xmlns:a14="http://schemas.microsoft.com/office/drawing/2010/main" w="9525">
+                <a14:hiddenLine xmlns:a14="http://schemas.microsoft.com/office/drawing/2010/main" xmlns="" w="9525">
                   <a:solidFill>
                     <a:srgbClr val="000000"/>
                   </a:solidFill>
@@ -13840,7 +13841,7 @@
             </a:ln>
             <a:extLst>
               <a:ext uri="{91240B29-F687-4f45-9708-019B960494DF}">
-                <a14:hiddenLine xmlns="" xmlns:a14="http://schemas.microsoft.com/office/drawing/2010/main" w="9525">
+                <a14:hiddenLine xmlns:a14="http://schemas.microsoft.com/office/drawing/2010/main" xmlns="" w="9525">
                   <a:solidFill>
                     <a:srgbClr val="000000"/>
                   </a:solidFill>
@@ -13930,7 +13931,7 @@
             </a:ln>
             <a:extLst>
               <a:ext uri="{91240B29-F687-4f45-9708-019B960494DF}">
-                <a14:hiddenLine xmlns="" xmlns:a14="http://schemas.microsoft.com/office/drawing/2010/main" w="9525">
+                <a14:hiddenLine xmlns:a14="http://schemas.microsoft.com/office/drawing/2010/main" xmlns="" w="9525">
                   <a:solidFill>
                     <a:srgbClr val="000000"/>
                   </a:solidFill>
@@ -13986,7 +13987,7 @@
             </a:ln>
             <a:extLst>
               <a:ext uri="{91240B29-F687-4f45-9708-019B960494DF}">
-                <a14:hiddenLine xmlns="" xmlns:a14="http://schemas.microsoft.com/office/drawing/2010/main" w="9525">
+                <a14:hiddenLine xmlns:a14="http://schemas.microsoft.com/office/drawing/2010/main" xmlns="" w="9525">
                   <a:solidFill>
                     <a:srgbClr val="000000"/>
                   </a:solidFill>
@@ -14076,7 +14077,7 @@
             </a:ln>
             <a:extLst>
               <a:ext uri="{91240B29-F687-4f45-9708-019B960494DF}">
-                <a14:hiddenLine xmlns="" xmlns:a14="http://schemas.microsoft.com/office/drawing/2010/main" w="9525">
+                <a14:hiddenLine xmlns:a14="http://schemas.microsoft.com/office/drawing/2010/main" xmlns="" w="9525">
                   <a:solidFill>
                     <a:srgbClr val="000000"/>
                   </a:solidFill>
@@ -14144,7 +14145,7 @@
             </a:ln>
             <a:extLst>
               <a:ext uri="{91240B29-F687-4f45-9708-019B960494DF}">
-                <a14:hiddenLine xmlns="" xmlns:a14="http://schemas.microsoft.com/office/drawing/2010/main" w="9525">
+                <a14:hiddenLine xmlns:a14="http://schemas.microsoft.com/office/drawing/2010/main" xmlns="" w="9525">
                   <a:solidFill>
                     <a:srgbClr val="000000"/>
                   </a:solidFill>
@@ -14234,7 +14235,7 @@
             </a:ln>
             <a:extLst>
               <a:ext uri="{91240B29-F687-4f45-9708-019B960494DF}">
-                <a14:hiddenLine xmlns="" xmlns:a14="http://schemas.microsoft.com/office/drawing/2010/main" w="9525">
+                <a14:hiddenLine xmlns:a14="http://schemas.microsoft.com/office/drawing/2010/main" xmlns="" w="9525">
                   <a:solidFill>
                     <a:srgbClr val="000000"/>
                   </a:solidFill>
@@ -14302,7 +14303,7 @@
             </a:ln>
             <a:extLst>
               <a:ext uri="{91240B29-F687-4f45-9708-019B960494DF}">
-                <a14:hiddenLine xmlns="" xmlns:a14="http://schemas.microsoft.com/office/drawing/2010/main" w="9525">
+                <a14:hiddenLine xmlns:a14="http://schemas.microsoft.com/office/drawing/2010/main" xmlns="" w="9525">
                   <a:solidFill>
                     <a:srgbClr val="000000"/>
                   </a:solidFill>
@@ -14392,7 +14393,7 @@
             </a:ln>
             <a:extLst>
               <a:ext uri="{91240B29-F687-4f45-9708-019B960494DF}">
-                <a14:hiddenLine xmlns="" xmlns:a14="http://schemas.microsoft.com/office/drawing/2010/main" w="9525">
+                <a14:hiddenLine xmlns:a14="http://schemas.microsoft.com/office/drawing/2010/main" xmlns="" w="9525">
                   <a:solidFill>
                     <a:srgbClr val="000000"/>
                   </a:solidFill>
@@ -14426,7 +14427,7 @@
             </a:ln>
             <a:extLst>
               <a:ext uri="{91240B29-F687-4f45-9708-019B960494DF}">
-                <a14:hiddenLine xmlns="" xmlns:a14="http://schemas.microsoft.com/office/drawing/2010/main" w="9525">
+                <a14:hiddenLine xmlns:a14="http://schemas.microsoft.com/office/drawing/2010/main" xmlns="" w="9525">
                   <a:solidFill>
                     <a:srgbClr val="000000"/>
                   </a:solidFill>
@@ -14516,7 +14517,7 @@
             </a:ln>
             <a:extLst>
               <a:ext uri="{91240B29-F687-4f45-9708-019B960494DF}">
-                <a14:hiddenLine xmlns="" xmlns:a14="http://schemas.microsoft.com/office/drawing/2010/main" w="9525">
+                <a14:hiddenLine xmlns:a14="http://schemas.microsoft.com/office/drawing/2010/main" xmlns="" w="9525">
                   <a:solidFill>
                     <a:srgbClr val="000000"/>
                   </a:solidFill>
@@ -14578,7 +14579,7 @@
             </a:ln>
             <a:extLst>
               <a:ext uri="{91240B29-F687-4f45-9708-019B960494DF}">
-                <a14:hiddenLine xmlns="" xmlns:a14="http://schemas.microsoft.com/office/drawing/2010/main" w="9525">
+                <a14:hiddenLine xmlns:a14="http://schemas.microsoft.com/office/drawing/2010/main" xmlns="" w="9525">
                   <a:solidFill>
                     <a:srgbClr val="000000"/>
                   </a:solidFill>
@@ -14640,7 +14641,7 @@
             </a:ln>
             <a:extLst>
               <a:ext uri="{91240B29-F687-4f45-9708-019B960494DF}">
-                <a14:hiddenLine xmlns="" xmlns:a14="http://schemas.microsoft.com/office/drawing/2010/main" w="9525">
+                <a14:hiddenLine xmlns:a14="http://schemas.microsoft.com/office/drawing/2010/main" xmlns="" w="9525">
                   <a:solidFill>
                     <a:srgbClr val="000000"/>
                   </a:solidFill>
@@ -14730,7 +14731,7 @@
             </a:ln>
             <a:extLst>
               <a:ext uri="{91240B29-F687-4f45-9708-019B960494DF}">
-                <a14:hiddenLine xmlns="" xmlns:a14="http://schemas.microsoft.com/office/drawing/2010/main" w="9525">
+                <a14:hiddenLine xmlns:a14="http://schemas.microsoft.com/office/drawing/2010/main" xmlns="" w="9525">
                   <a:solidFill>
                     <a:srgbClr val="000000"/>
                   </a:solidFill>
@@ -14798,7 +14799,7 @@
             </a:ln>
             <a:extLst>
               <a:ext uri="{91240B29-F687-4f45-9708-019B960494DF}">
-                <a14:hiddenLine xmlns="" xmlns:a14="http://schemas.microsoft.com/office/drawing/2010/main" w="9525">
+                <a14:hiddenLine xmlns:a14="http://schemas.microsoft.com/office/drawing/2010/main" xmlns="" w="9525">
                   <a:solidFill>
                     <a:srgbClr val="000000"/>
                   </a:solidFill>
@@ -14860,7 +14861,7 @@
             </a:ln>
             <a:extLst>
               <a:ext uri="{91240B29-F687-4f45-9708-019B960494DF}">
-                <a14:hiddenLine xmlns="" xmlns:a14="http://schemas.microsoft.com/office/drawing/2010/main" w="9525">
+                <a14:hiddenLine xmlns:a14="http://schemas.microsoft.com/office/drawing/2010/main" xmlns="" w="9525">
                   <a:solidFill>
                     <a:srgbClr val="000000"/>
                   </a:solidFill>
@@ -14950,7 +14951,7 @@
             </a:ln>
             <a:extLst>
               <a:ext uri="{91240B29-F687-4f45-9708-019B960494DF}">
-                <a14:hiddenLine xmlns="" xmlns:a14="http://schemas.microsoft.com/office/drawing/2010/main" w="9525">
+                <a14:hiddenLine xmlns:a14="http://schemas.microsoft.com/office/drawing/2010/main" xmlns="" w="9525">
                   <a:solidFill>
                     <a:srgbClr val="000000"/>
                   </a:solidFill>
@@ -15012,7 +15013,7 @@
             </a:ln>
             <a:extLst>
               <a:ext uri="{91240B29-F687-4f45-9708-019B960494DF}">
-                <a14:hiddenLine xmlns="" xmlns:a14="http://schemas.microsoft.com/office/drawing/2010/main" w="9525">
+                <a14:hiddenLine xmlns:a14="http://schemas.microsoft.com/office/drawing/2010/main" xmlns="" w="9525">
                   <a:solidFill>
                     <a:srgbClr val="000000"/>
                   </a:solidFill>
@@ -15102,7 +15103,7 @@
             </a:ln>
             <a:extLst>
               <a:ext uri="{91240B29-F687-4f45-9708-019B960494DF}">
-                <a14:hiddenLine xmlns="" xmlns:a14="http://schemas.microsoft.com/office/drawing/2010/main" w="9525">
+                <a14:hiddenLine xmlns:a14="http://schemas.microsoft.com/office/drawing/2010/main" xmlns="" w="9525">
                   <a:solidFill>
                     <a:srgbClr val="000000"/>
                   </a:solidFill>
@@ -15164,7 +15165,7 @@
             </a:ln>
             <a:extLst>
               <a:ext uri="{91240B29-F687-4f45-9708-019B960494DF}">
-                <a14:hiddenLine xmlns="" xmlns:a14="http://schemas.microsoft.com/office/drawing/2010/main" w="9525">
+                <a14:hiddenLine xmlns:a14="http://schemas.microsoft.com/office/drawing/2010/main" xmlns="" w="9525">
                   <a:solidFill>
                     <a:srgbClr val="000000"/>
                   </a:solidFill>
@@ -15254,7 +15255,7 @@
             </a:ln>
             <a:extLst>
               <a:ext uri="{91240B29-F687-4f45-9708-019B960494DF}">
-                <a14:hiddenLine xmlns="" xmlns:a14="http://schemas.microsoft.com/office/drawing/2010/main" w="9525">
+                <a14:hiddenLine xmlns:a14="http://schemas.microsoft.com/office/drawing/2010/main" xmlns="" w="9525">
                   <a:solidFill>
                     <a:srgbClr val="000000"/>
                   </a:solidFill>
@@ -15288,7 +15289,7 @@
             </a:ln>
             <a:extLst>
               <a:ext uri="{91240B29-F687-4f45-9708-019B960494DF}">
-                <a14:hiddenLine xmlns="" xmlns:a14="http://schemas.microsoft.com/office/drawing/2010/main" w="9525">
+                <a14:hiddenLine xmlns:a14="http://schemas.microsoft.com/office/drawing/2010/main" xmlns="" w="9525">
                   <a:solidFill>
                     <a:srgbClr val="000000"/>
                   </a:solidFill>
@@ -15353,7 +15354,7 @@
             </a:ln>
             <a:extLst>
               <a:ext uri="{91240B29-F687-4f45-9708-019B960494DF}">
-                <a14:hiddenLine xmlns="" xmlns:a14="http://schemas.microsoft.com/office/drawing/2010/main" w="9525">
+                <a14:hiddenLine xmlns:a14="http://schemas.microsoft.com/office/drawing/2010/main" xmlns="" w="9525">
                   <a:solidFill>
                     <a:srgbClr val="000000"/>
                   </a:solidFill>
@@ -15443,7 +15444,7 @@
             </a:ln>
             <a:extLst>
               <a:ext uri="{91240B29-F687-4f45-9708-019B960494DF}">
-                <a14:hiddenLine xmlns="" xmlns:a14="http://schemas.microsoft.com/office/drawing/2010/main" w="9525">
+                <a14:hiddenLine xmlns:a14="http://schemas.microsoft.com/office/drawing/2010/main" xmlns="" w="9525">
                   <a:solidFill>
                     <a:srgbClr val="000000"/>
                   </a:solidFill>
@@ -15505,7 +15506,7 @@
             </a:ln>
             <a:extLst>
               <a:ext uri="{91240B29-F687-4f45-9708-019B960494DF}">
-                <a14:hiddenLine xmlns="" xmlns:a14="http://schemas.microsoft.com/office/drawing/2010/main" w="9525">
+                <a14:hiddenLine xmlns:a14="http://schemas.microsoft.com/office/drawing/2010/main" xmlns="" w="9525">
                   <a:solidFill>
                     <a:srgbClr val="000000"/>
                   </a:solidFill>
@@ -15595,7 +15596,7 @@
             </a:ln>
             <a:extLst>
               <a:ext uri="{91240B29-F687-4f45-9708-019B960494DF}">
-                <a14:hiddenLine xmlns="" xmlns:a14="http://schemas.microsoft.com/office/drawing/2010/main" w="9525">
+                <a14:hiddenLine xmlns:a14="http://schemas.microsoft.com/office/drawing/2010/main" xmlns="" w="9525">
                   <a:solidFill>
                     <a:srgbClr val="000000"/>
                   </a:solidFill>
@@ -15685,7 +15686,7 @@
             </a:ln>
             <a:extLst>
               <a:ext uri="{91240B29-F687-4f45-9708-019B960494DF}">
-                <a14:hiddenLine xmlns="" xmlns:a14="http://schemas.microsoft.com/office/drawing/2010/main" w="9525">
+                <a14:hiddenLine xmlns:a14="http://schemas.microsoft.com/office/drawing/2010/main" xmlns="" w="9525">
                   <a:solidFill>
                     <a:srgbClr val="000000"/>
                   </a:solidFill>
@@ -15750,7 +15751,7 @@
             </a:ln>
             <a:extLst>
               <a:ext uri="{91240B29-F687-4f45-9708-019B960494DF}">
-                <a14:hiddenLine xmlns="" xmlns:a14="http://schemas.microsoft.com/office/drawing/2010/main" w="9525">
+                <a14:hiddenLine xmlns:a14="http://schemas.microsoft.com/office/drawing/2010/main" xmlns="" w="9525">
                   <a:solidFill>
                     <a:srgbClr val="000000"/>
                   </a:solidFill>
@@ -15812,7 +15813,7 @@
             </a:ln>
             <a:extLst>
               <a:ext uri="{91240B29-F687-4f45-9708-019B960494DF}">
-                <a14:hiddenLine xmlns="" xmlns:a14="http://schemas.microsoft.com/office/drawing/2010/main" w="9525">
+                <a14:hiddenLine xmlns:a14="http://schemas.microsoft.com/office/drawing/2010/main" xmlns="" w="9525">
                   <a:solidFill>
                     <a:srgbClr val="000000"/>
                   </a:solidFill>
@@ -15902,7 +15903,7 @@
             </a:ln>
             <a:extLst>
               <a:ext uri="{91240B29-F687-4f45-9708-019B960494DF}">
-                <a14:hiddenLine xmlns="" xmlns:a14="http://schemas.microsoft.com/office/drawing/2010/main" w="9525">
+                <a14:hiddenLine xmlns:a14="http://schemas.microsoft.com/office/drawing/2010/main" xmlns="" w="9525">
                   <a:solidFill>
                     <a:srgbClr val="000000"/>
                   </a:solidFill>
@@ -15992,7 +15993,7 @@
             </a:ln>
             <a:extLst>
               <a:ext uri="{91240B29-F687-4f45-9708-019B960494DF}">
-                <a14:hiddenLine xmlns="" xmlns:a14="http://schemas.microsoft.com/office/drawing/2010/main" w="9525">
+                <a14:hiddenLine xmlns:a14="http://schemas.microsoft.com/office/drawing/2010/main" xmlns="" w="9525">
                   <a:solidFill>
                     <a:srgbClr val="000000"/>
                   </a:solidFill>
@@ -16054,7 +16055,7 @@
             </a:ln>
             <a:extLst>
               <a:ext uri="{91240B29-F687-4f45-9708-019B960494DF}">
-                <a14:hiddenLine xmlns="" xmlns:a14="http://schemas.microsoft.com/office/drawing/2010/main" w="9525">
+                <a14:hiddenLine xmlns:a14="http://schemas.microsoft.com/office/drawing/2010/main" xmlns="" w="9525">
                   <a:solidFill>
                     <a:srgbClr val="000000"/>
                   </a:solidFill>
@@ -16174,7 +16175,7 @@
             </a:ln>
             <a:extLst>
               <a:ext uri="{91240B29-F687-4f45-9708-019B960494DF}">
-                <a14:hiddenLine xmlns="" xmlns:a14="http://schemas.microsoft.com/office/drawing/2010/main" w="9525">
+                <a14:hiddenLine xmlns:a14="http://schemas.microsoft.com/office/drawing/2010/main" xmlns="" w="9525">
                   <a:solidFill>
                     <a:srgbClr val="000000"/>
                   </a:solidFill>
@@ -16242,7 +16243,7 @@
             </a:ln>
             <a:extLst>
               <a:ext uri="{91240B29-F687-4f45-9708-019B960494DF}">
-                <a14:hiddenLine xmlns="" xmlns:a14="http://schemas.microsoft.com/office/drawing/2010/main" w="9525">
+                <a14:hiddenLine xmlns:a14="http://schemas.microsoft.com/office/drawing/2010/main" xmlns="" w="9525">
                   <a:solidFill>
                     <a:srgbClr val="000000"/>
                   </a:solidFill>
@@ -16332,7 +16333,7 @@
             </a:ln>
             <a:extLst>
               <a:ext uri="{91240B29-F687-4f45-9708-019B960494DF}">
-                <a14:hiddenLine xmlns="" xmlns:a14="http://schemas.microsoft.com/office/drawing/2010/main" w="9525">
+                <a14:hiddenLine xmlns:a14="http://schemas.microsoft.com/office/drawing/2010/main" xmlns="" w="9525">
                   <a:solidFill>
                     <a:srgbClr val="000000"/>
                   </a:solidFill>
@@ -16472,7 +16473,7 @@
           <a:p>
             <a:fld id="{52C02C3A-F3EC-431D-BD4C-85B7465FC644}" type="datetimeFigureOut">
               <a:rPr lang="en-IL" smtClean="0"/>
-              <a:t>05/08/2024</a:t>
+              <a:t>23/11/2024</a:t>
             </a:fld>
             <a:endParaRPr lang="en-IL"/>
           </a:p>
@@ -16739,7 +16740,7 @@
           <a:p>
             <a:fld id="{52C02C3A-F3EC-431D-BD4C-85B7465FC644}" type="datetimeFigureOut">
               <a:rPr lang="en-IL" smtClean="0"/>
-              <a:t>05/08/2024</a:t>
+              <a:t>23/11/2024</a:t>
             </a:fld>
             <a:endParaRPr lang="en-IL"/>
           </a:p>
@@ -16935,7 +16936,7 @@
           <a:p>
             <a:fld id="{52C02C3A-F3EC-431D-BD4C-85B7465FC644}" type="datetimeFigureOut">
               <a:rPr lang="en-IL" smtClean="0"/>
-              <a:t>05/08/2024</a:t>
+              <a:t>23/11/2024</a:t>
             </a:fld>
             <a:endParaRPr lang="en-IL"/>
           </a:p>
@@ -17198,7 +17199,7 @@
           <a:p>
             <a:fld id="{52C02C3A-F3EC-431D-BD4C-85B7465FC644}" type="datetimeFigureOut">
               <a:rPr lang="en-IL" smtClean="0"/>
-              <a:t>05/08/2024</a:t>
+              <a:t>23/11/2024</a:t>
             </a:fld>
             <a:endParaRPr lang="en-IL"/>
           </a:p>
@@ -17632,7 +17633,7 @@
           <a:p>
             <a:fld id="{52C02C3A-F3EC-431D-BD4C-85B7465FC644}" type="datetimeFigureOut">
               <a:rPr lang="en-IL" smtClean="0"/>
-              <a:t>05/08/2024</a:t>
+              <a:t>23/11/2024</a:t>
             </a:fld>
             <a:endParaRPr lang="en-IL"/>
           </a:p>
@@ -18178,7 +18179,7 @@
           <a:p>
             <a:fld id="{52C02C3A-F3EC-431D-BD4C-85B7465FC644}" type="datetimeFigureOut">
               <a:rPr lang="en-IL" smtClean="0"/>
-              <a:t>05/08/2024</a:t>
+              <a:t>23/11/2024</a:t>
             </a:fld>
             <a:endParaRPr lang="en-IL"/>
           </a:p>
@@ -18898,7 +18899,7 @@
           <a:p>
             <a:fld id="{52C02C3A-F3EC-431D-BD4C-85B7465FC644}" type="datetimeFigureOut">
               <a:rPr lang="en-IL" smtClean="0"/>
-              <a:t>05/08/2024</a:t>
+              <a:t>23/11/2024</a:t>
             </a:fld>
             <a:endParaRPr lang="en-IL"/>
           </a:p>
@@ -19068,7 +19069,7 @@
           <a:p>
             <a:fld id="{52C02C3A-F3EC-431D-BD4C-85B7465FC644}" type="datetimeFigureOut">
               <a:rPr lang="en-IL" smtClean="0"/>
-              <a:t>05/08/2024</a:t>
+              <a:t>23/11/2024</a:t>
             </a:fld>
             <a:endParaRPr lang="en-IL"/>
           </a:p>
@@ -19248,7 +19249,7 @@
           <a:p>
             <a:fld id="{52C02C3A-F3EC-431D-BD4C-85B7465FC644}" type="datetimeFigureOut">
               <a:rPr lang="en-IL" smtClean="0"/>
-              <a:t>05/08/2024</a:t>
+              <a:t>23/11/2024</a:t>
             </a:fld>
             <a:endParaRPr lang="en-IL"/>
           </a:p>
@@ -19418,7 +19419,7 @@
           <a:p>
             <a:fld id="{52C02C3A-F3EC-431D-BD4C-85B7465FC644}" type="datetimeFigureOut">
               <a:rPr lang="en-IL" smtClean="0"/>
-              <a:t>05/08/2024</a:t>
+              <a:t>23/11/2024</a:t>
             </a:fld>
             <a:endParaRPr lang="en-IL"/>
           </a:p>
@@ -19668,7 +19669,7 @@
           <a:p>
             <a:fld id="{52C02C3A-F3EC-431D-BD4C-85B7465FC644}" type="datetimeFigureOut">
               <a:rPr lang="en-IL" smtClean="0"/>
-              <a:t>05/08/2024</a:t>
+              <a:t>23/11/2024</a:t>
             </a:fld>
             <a:endParaRPr lang="en-IL"/>
           </a:p>
@@ -19900,7 +19901,7 @@
           <a:p>
             <a:fld id="{52C02C3A-F3EC-431D-BD4C-85B7465FC644}" type="datetimeFigureOut">
               <a:rPr lang="en-IL" smtClean="0"/>
-              <a:t>05/08/2024</a:t>
+              <a:t>23/11/2024</a:t>
             </a:fld>
             <a:endParaRPr lang="en-IL"/>
           </a:p>
@@ -20281,7 +20282,7 @@
           <a:p>
             <a:fld id="{52C02C3A-F3EC-431D-BD4C-85B7465FC644}" type="datetimeFigureOut">
               <a:rPr lang="en-IL" smtClean="0"/>
-              <a:t>05/08/2024</a:t>
+              <a:t>23/11/2024</a:t>
             </a:fld>
             <a:endParaRPr lang="en-IL"/>
           </a:p>
@@ -20399,7 +20400,7 @@
           <a:p>
             <a:fld id="{52C02C3A-F3EC-431D-BD4C-85B7465FC644}" type="datetimeFigureOut">
               <a:rPr lang="en-IL" smtClean="0"/>
-              <a:t>05/08/2024</a:t>
+              <a:t>23/11/2024</a:t>
             </a:fld>
             <a:endParaRPr lang="en-IL"/>
           </a:p>
@@ -20494,7 +20495,7 @@
           <a:p>
             <a:fld id="{52C02C3A-F3EC-431D-BD4C-85B7465FC644}" type="datetimeFigureOut">
               <a:rPr lang="en-IL" smtClean="0"/>
-              <a:t>05/08/2024</a:t>
+              <a:t>23/11/2024</a:t>
             </a:fld>
             <a:endParaRPr lang="en-IL"/>
           </a:p>
@@ -20743,7 +20744,7 @@
           <a:p>
             <a:fld id="{52C02C3A-F3EC-431D-BD4C-85B7465FC644}" type="datetimeFigureOut">
               <a:rPr lang="en-IL" smtClean="0"/>
-              <a:t>05/08/2024</a:t>
+              <a:t>23/11/2024</a:t>
             </a:fld>
             <a:endParaRPr lang="en-IL"/>
           </a:p>
@@ -21023,7 +21024,7 @@
           <a:p>
             <a:fld id="{52C02C3A-F3EC-431D-BD4C-85B7465FC644}" type="datetimeFigureOut">
               <a:rPr lang="en-IL" smtClean="0"/>
-              <a:t>05/08/2024</a:t>
+              <a:t>23/11/2024</a:t>
             </a:fld>
             <a:endParaRPr lang="en-IL"/>
           </a:p>
@@ -21139,7 +21140,7 @@
           <a:noFill/>
           <a:extLst>
             <a:ext uri="{909E8E84-426E-40dd-AFC4-6F175D3DCCD1}">
-              <a14:hiddenFill xmlns="" xmlns:a14="http://schemas.microsoft.com/office/drawing/2010/main">
+              <a14:hiddenFill xmlns:a14="http://schemas.microsoft.com/office/drawing/2010/main" xmlns="">
                 <a:solidFill>
                   <a:srgbClr val="FFFFFF"/>
                 </a:solidFill>
@@ -21213,7 +21214,7 @@
               </a:ln>
               <a:extLst>
                 <a:ext uri="{91240B29-F687-4f45-9708-019B960494DF}">
-                  <a14:hiddenLine xmlns="" xmlns:a14="http://schemas.microsoft.com/office/drawing/2010/main" w="9525">
+                  <a14:hiddenLine xmlns:a14="http://schemas.microsoft.com/office/drawing/2010/main" xmlns="" w="9525">
                     <a:solidFill>
                       <a:srgbClr val="000000"/>
                     </a:solidFill>
@@ -21303,7 +21304,7 @@
               </a:ln>
               <a:extLst>
                 <a:ext uri="{91240B29-F687-4f45-9708-019B960494DF}">
-                  <a14:hiddenLine xmlns="" xmlns:a14="http://schemas.microsoft.com/office/drawing/2010/main" w="9525">
+                  <a14:hiddenLine xmlns:a14="http://schemas.microsoft.com/office/drawing/2010/main" xmlns="" w="9525">
                     <a:solidFill>
                       <a:srgbClr val="000000"/>
                     </a:solidFill>
@@ -21393,7 +21394,7 @@
               </a:ln>
               <a:extLst>
                 <a:ext uri="{91240B29-F687-4f45-9708-019B960494DF}">
-                  <a14:hiddenLine xmlns="" xmlns:a14="http://schemas.microsoft.com/office/drawing/2010/main" w="9525">
+                  <a14:hiddenLine xmlns:a14="http://schemas.microsoft.com/office/drawing/2010/main" xmlns="" w="9525">
                     <a:solidFill>
                       <a:srgbClr val="000000"/>
                     </a:solidFill>
@@ -21455,7 +21456,7 @@
               </a:ln>
               <a:extLst>
                 <a:ext uri="{91240B29-F687-4f45-9708-019B960494DF}">
-                  <a14:hiddenLine xmlns="" xmlns:a14="http://schemas.microsoft.com/office/drawing/2010/main" w="9525">
+                  <a14:hiddenLine xmlns:a14="http://schemas.microsoft.com/office/drawing/2010/main" xmlns="" w="9525">
                     <a:solidFill>
                       <a:srgbClr val="000000"/>
                     </a:solidFill>
@@ -21545,7 +21546,7 @@
               </a:ln>
               <a:extLst>
                 <a:ext uri="{91240B29-F687-4f45-9708-019B960494DF}">
-                  <a14:hiddenLine xmlns="" xmlns:a14="http://schemas.microsoft.com/office/drawing/2010/main" w="9525">
+                  <a14:hiddenLine xmlns:a14="http://schemas.microsoft.com/office/drawing/2010/main" xmlns="" w="9525">
                     <a:solidFill>
                       <a:srgbClr val="000000"/>
                     </a:solidFill>
@@ -21607,7 +21608,7 @@
               </a:ln>
               <a:extLst>
                 <a:ext uri="{91240B29-F687-4f45-9708-019B960494DF}">
-                  <a14:hiddenLine xmlns="" xmlns:a14="http://schemas.microsoft.com/office/drawing/2010/main" w="9525">
+                  <a14:hiddenLine xmlns:a14="http://schemas.microsoft.com/office/drawing/2010/main" xmlns="" w="9525">
                     <a:solidFill>
                       <a:srgbClr val="000000"/>
                     </a:solidFill>
@@ -21669,7 +21670,7 @@
               </a:ln>
               <a:extLst>
                 <a:ext uri="{91240B29-F687-4f45-9708-019B960494DF}">
-                  <a14:hiddenLine xmlns="" xmlns:a14="http://schemas.microsoft.com/office/drawing/2010/main" w="9525">
+                  <a14:hiddenLine xmlns:a14="http://schemas.microsoft.com/office/drawing/2010/main" xmlns="" w="9525">
                     <a:solidFill>
                       <a:srgbClr val="000000"/>
                     </a:solidFill>
@@ -21759,7 +21760,7 @@
               </a:ln>
               <a:extLst>
                 <a:ext uri="{91240B29-F687-4f45-9708-019B960494DF}">
-                  <a14:hiddenLine xmlns="" xmlns:a14="http://schemas.microsoft.com/office/drawing/2010/main" w="9525">
+                  <a14:hiddenLine xmlns:a14="http://schemas.microsoft.com/office/drawing/2010/main" xmlns="" w="9525">
                     <a:solidFill>
                       <a:srgbClr val="000000"/>
                     </a:solidFill>
@@ -21849,7 +21850,7 @@
               </a:ln>
               <a:extLst>
                 <a:ext uri="{91240B29-F687-4f45-9708-019B960494DF}">
-                  <a14:hiddenLine xmlns="" xmlns:a14="http://schemas.microsoft.com/office/drawing/2010/main" w="9525">
+                  <a14:hiddenLine xmlns:a14="http://schemas.microsoft.com/office/drawing/2010/main" xmlns="" w="9525">
                     <a:solidFill>
                       <a:srgbClr val="000000"/>
                     </a:solidFill>
@@ -21911,7 +21912,7 @@
               </a:ln>
               <a:extLst>
                 <a:ext uri="{91240B29-F687-4f45-9708-019B960494DF}">
-                  <a14:hiddenLine xmlns="" xmlns:a14="http://schemas.microsoft.com/office/drawing/2010/main" w="9525">
+                  <a14:hiddenLine xmlns:a14="http://schemas.microsoft.com/office/drawing/2010/main" xmlns="" w="9525">
                     <a:solidFill>
                       <a:srgbClr val="000000"/>
                     </a:solidFill>
@@ -22021,7 +22022,7 @@
               </a:ln>
               <a:extLst>
                 <a:ext uri="{91240B29-F687-4f45-9708-019B960494DF}">
-                  <a14:hiddenLine xmlns="" xmlns:a14="http://schemas.microsoft.com/office/drawing/2010/main" w="9525">
+                  <a14:hiddenLine xmlns:a14="http://schemas.microsoft.com/office/drawing/2010/main" xmlns="" w="9525">
                     <a:solidFill>
                       <a:srgbClr val="000000"/>
                     </a:solidFill>
@@ -22105,7 +22106,7 @@
               </a:ln>
               <a:extLst>
                 <a:ext uri="{91240B29-F687-4f45-9708-019B960494DF}">
-                  <a14:hiddenLine xmlns="" xmlns:a14="http://schemas.microsoft.com/office/drawing/2010/main" w="9525">
+                  <a14:hiddenLine xmlns:a14="http://schemas.microsoft.com/office/drawing/2010/main" xmlns="" w="9525">
                     <a:solidFill>
                       <a:srgbClr val="000000"/>
                     </a:solidFill>
@@ -22167,7 +22168,7 @@
               </a:ln>
               <a:extLst>
                 <a:ext uri="{91240B29-F687-4f45-9708-019B960494DF}">
-                  <a14:hiddenLine xmlns="" xmlns:a14="http://schemas.microsoft.com/office/drawing/2010/main" w="9525">
+                  <a14:hiddenLine xmlns:a14="http://schemas.microsoft.com/office/drawing/2010/main" xmlns="" w="9525">
                     <a:solidFill>
                       <a:srgbClr val="000000"/>
                     </a:solidFill>
@@ -22229,7 +22230,7 @@
               </a:ln>
               <a:extLst>
                 <a:ext uri="{91240B29-F687-4f45-9708-019B960494DF}">
-                  <a14:hiddenLine xmlns="" xmlns:a14="http://schemas.microsoft.com/office/drawing/2010/main" w="9525">
+                  <a14:hiddenLine xmlns:a14="http://schemas.microsoft.com/office/drawing/2010/main" xmlns="" w="9525">
                     <a:solidFill>
                       <a:srgbClr val="000000"/>
                     </a:solidFill>
@@ -22319,7 +22320,7 @@
               </a:ln>
               <a:extLst>
                 <a:ext uri="{91240B29-F687-4f45-9708-019B960494DF}">
-                  <a14:hiddenLine xmlns="" xmlns:a14="http://schemas.microsoft.com/office/drawing/2010/main" w="9525">
+                  <a14:hiddenLine xmlns:a14="http://schemas.microsoft.com/office/drawing/2010/main" xmlns="" w="9525">
                     <a:solidFill>
                       <a:srgbClr val="000000"/>
                     </a:solidFill>
@@ -22353,7 +22354,7 @@
               </a:ln>
               <a:extLst>
                 <a:ext uri="{91240B29-F687-4f45-9708-019B960494DF}">
-                  <a14:hiddenLine xmlns="" xmlns:a14="http://schemas.microsoft.com/office/drawing/2010/main" w="9525">
+                  <a14:hiddenLine xmlns:a14="http://schemas.microsoft.com/office/drawing/2010/main" xmlns="" w="9525">
                     <a:solidFill>
                       <a:srgbClr val="000000"/>
                     </a:solidFill>
@@ -22418,7 +22419,7 @@
               </a:ln>
               <a:extLst>
                 <a:ext uri="{91240B29-F687-4f45-9708-019B960494DF}">
-                  <a14:hiddenLine xmlns="" xmlns:a14="http://schemas.microsoft.com/office/drawing/2010/main" w="9525">
+                  <a14:hiddenLine xmlns:a14="http://schemas.microsoft.com/office/drawing/2010/main" xmlns="" w="9525">
                     <a:solidFill>
                       <a:srgbClr val="000000"/>
                     </a:solidFill>
@@ -22508,7 +22509,7 @@
               </a:ln>
               <a:extLst>
                 <a:ext uri="{91240B29-F687-4f45-9708-019B960494DF}">
-                  <a14:hiddenLine xmlns="" xmlns:a14="http://schemas.microsoft.com/office/drawing/2010/main" w="9525">
+                  <a14:hiddenLine xmlns:a14="http://schemas.microsoft.com/office/drawing/2010/main" xmlns="" w="9525">
                     <a:solidFill>
                       <a:srgbClr val="000000"/>
                     </a:solidFill>
@@ -22570,7 +22571,7 @@
               </a:ln>
               <a:extLst>
                 <a:ext uri="{91240B29-F687-4f45-9708-019B960494DF}">
-                  <a14:hiddenLine xmlns="" xmlns:a14="http://schemas.microsoft.com/office/drawing/2010/main" w="9525">
+                  <a14:hiddenLine xmlns:a14="http://schemas.microsoft.com/office/drawing/2010/main" xmlns="" w="9525">
                     <a:solidFill>
                       <a:srgbClr val="000000"/>
                     </a:solidFill>
@@ -22660,7 +22661,7 @@
               </a:ln>
               <a:extLst>
                 <a:ext uri="{91240B29-F687-4f45-9708-019B960494DF}">
-                  <a14:hiddenLine xmlns="" xmlns:a14="http://schemas.microsoft.com/office/drawing/2010/main" w="9525">
+                  <a14:hiddenLine xmlns:a14="http://schemas.microsoft.com/office/drawing/2010/main" xmlns="" w="9525">
                     <a:solidFill>
                       <a:srgbClr val="000000"/>
                     </a:solidFill>
@@ -22725,7 +22726,7 @@
               </a:ln>
               <a:extLst>
                 <a:ext uri="{91240B29-F687-4f45-9708-019B960494DF}">
-                  <a14:hiddenLine xmlns="" xmlns:a14="http://schemas.microsoft.com/office/drawing/2010/main" w="9525">
+                  <a14:hiddenLine xmlns:a14="http://schemas.microsoft.com/office/drawing/2010/main" xmlns="" w="9525">
                     <a:solidFill>
                       <a:srgbClr val="000000"/>
                     </a:solidFill>
@@ -22787,7 +22788,7 @@
               </a:ln>
               <a:extLst>
                 <a:ext uri="{91240B29-F687-4f45-9708-019B960494DF}">
-                  <a14:hiddenLine xmlns="" xmlns:a14="http://schemas.microsoft.com/office/drawing/2010/main" w="9525">
+                  <a14:hiddenLine xmlns:a14="http://schemas.microsoft.com/office/drawing/2010/main" xmlns="" w="9525">
                     <a:solidFill>
                       <a:srgbClr val="000000"/>
                     </a:solidFill>
@@ -22877,7 +22878,7 @@
               </a:ln>
               <a:extLst>
                 <a:ext uri="{91240B29-F687-4f45-9708-019B960494DF}">
-                  <a14:hiddenLine xmlns="" xmlns:a14="http://schemas.microsoft.com/office/drawing/2010/main" w="9525">
+                  <a14:hiddenLine xmlns:a14="http://schemas.microsoft.com/office/drawing/2010/main" xmlns="" w="9525">
                     <a:solidFill>
                       <a:srgbClr val="000000"/>
                     </a:solidFill>
@@ -22967,7 +22968,7 @@
               </a:ln>
               <a:extLst>
                 <a:ext uri="{91240B29-F687-4f45-9708-019B960494DF}">
-                  <a14:hiddenLine xmlns="" xmlns:a14="http://schemas.microsoft.com/office/drawing/2010/main" w="9525">
+                  <a14:hiddenLine xmlns:a14="http://schemas.microsoft.com/office/drawing/2010/main" xmlns="" w="9525">
                     <a:solidFill>
                       <a:srgbClr val="000000"/>
                     </a:solidFill>
@@ -23032,7 +23033,7 @@
               </a:ln>
               <a:extLst>
                 <a:ext uri="{91240B29-F687-4f45-9708-019B960494DF}">
-                  <a14:hiddenLine xmlns="" xmlns:a14="http://schemas.microsoft.com/office/drawing/2010/main" w="9525">
+                  <a14:hiddenLine xmlns:a14="http://schemas.microsoft.com/office/drawing/2010/main" xmlns="" w="9525">
                     <a:solidFill>
                       <a:srgbClr val="000000"/>
                     </a:solidFill>
@@ -23152,7 +23153,7 @@
               </a:ln>
               <a:extLst>
                 <a:ext uri="{91240B29-F687-4f45-9708-019B960494DF}">
-                  <a14:hiddenLine xmlns="" xmlns:a14="http://schemas.microsoft.com/office/drawing/2010/main" w="9525">
+                  <a14:hiddenLine xmlns:a14="http://schemas.microsoft.com/office/drawing/2010/main" xmlns="" w="9525">
                     <a:solidFill>
                       <a:srgbClr val="000000"/>
                     </a:solidFill>
@@ -23250,7 +23251,7 @@
               </a:ln>
               <a:extLst>
                 <a:ext uri="{91240B29-F687-4f45-9708-019B960494DF}">
-                  <a14:hiddenLine xmlns="" xmlns:a14="http://schemas.microsoft.com/office/drawing/2010/main" w="9525">
+                  <a14:hiddenLine xmlns:a14="http://schemas.microsoft.com/office/drawing/2010/main" xmlns="" w="9525">
                     <a:solidFill>
                       <a:srgbClr val="000000"/>
                     </a:solidFill>
@@ -23365,7 +23366,7 @@
               </a:ln>
               <a:extLst>
                 <a:ext uri="{91240B29-F687-4f45-9708-019B960494DF}">
-                  <a14:hiddenLine xmlns="" xmlns:a14="http://schemas.microsoft.com/office/drawing/2010/main" w="9525">
+                  <a14:hiddenLine xmlns:a14="http://schemas.microsoft.com/office/drawing/2010/main" xmlns="" w="9525">
                     <a:solidFill>
                       <a:srgbClr val="000000"/>
                     </a:solidFill>
@@ -23455,7 +23456,7 @@
               </a:ln>
               <a:extLst>
                 <a:ext uri="{91240B29-F687-4f45-9708-019B960494DF}">
-                  <a14:hiddenLine xmlns="" xmlns:a14="http://schemas.microsoft.com/office/drawing/2010/main" w="9525">
+                  <a14:hiddenLine xmlns:a14="http://schemas.microsoft.com/office/drawing/2010/main" xmlns="" w="9525">
                     <a:solidFill>
                       <a:srgbClr val="000000"/>
                     </a:solidFill>
@@ -23520,7 +23521,7 @@
               </a:ln>
               <a:extLst>
                 <a:ext uri="{91240B29-F687-4f45-9708-019B960494DF}">
-                  <a14:hiddenLine xmlns="" xmlns:a14="http://schemas.microsoft.com/office/drawing/2010/main" w="9525">
+                  <a14:hiddenLine xmlns:a14="http://schemas.microsoft.com/office/drawing/2010/main" xmlns="" w="9525">
                     <a:solidFill>
                       <a:srgbClr val="000000"/>
                     </a:solidFill>
@@ -23610,7 +23611,7 @@
               </a:ln>
               <a:extLst>
                 <a:ext uri="{91240B29-F687-4f45-9708-019B960494DF}">
-                  <a14:hiddenLine xmlns="" xmlns:a14="http://schemas.microsoft.com/office/drawing/2010/main" w="9525">
+                  <a14:hiddenLine xmlns:a14="http://schemas.microsoft.com/office/drawing/2010/main" xmlns="" w="9525">
                     <a:solidFill>
                       <a:srgbClr val="000000"/>
                     </a:solidFill>
@@ -23678,7 +23679,7 @@
               </a:ln>
               <a:extLst>
                 <a:ext uri="{91240B29-F687-4f45-9708-019B960494DF}">
-                  <a14:hiddenLine xmlns="" xmlns:a14="http://schemas.microsoft.com/office/drawing/2010/main" w="9525">
+                  <a14:hiddenLine xmlns:a14="http://schemas.microsoft.com/office/drawing/2010/main" xmlns="" w="9525">
                     <a:solidFill>
                       <a:srgbClr val="000000"/>
                     </a:solidFill>
@@ -23768,7 +23769,7 @@
               </a:ln>
               <a:extLst>
                 <a:ext uri="{91240B29-F687-4f45-9708-019B960494DF}">
-                  <a14:hiddenLine xmlns="" xmlns:a14="http://schemas.microsoft.com/office/drawing/2010/main" w="9525">
+                  <a14:hiddenLine xmlns:a14="http://schemas.microsoft.com/office/drawing/2010/main" xmlns="" w="9525">
                     <a:solidFill>
                       <a:srgbClr val="000000"/>
                     </a:solidFill>
@@ -23836,7 +23837,7 @@
               </a:ln>
               <a:extLst>
                 <a:ext uri="{91240B29-F687-4f45-9708-019B960494DF}">
-                  <a14:hiddenLine xmlns="" xmlns:a14="http://schemas.microsoft.com/office/drawing/2010/main" w="9525">
+                  <a14:hiddenLine xmlns:a14="http://schemas.microsoft.com/office/drawing/2010/main" xmlns="" w="9525">
                     <a:solidFill>
                       <a:srgbClr val="000000"/>
                     </a:solidFill>
@@ -23926,7 +23927,7 @@
               </a:ln>
               <a:extLst>
                 <a:ext uri="{91240B29-F687-4f45-9708-019B960494DF}">
-                  <a14:hiddenLine xmlns="" xmlns:a14="http://schemas.microsoft.com/office/drawing/2010/main" w="9525">
+                  <a14:hiddenLine xmlns:a14="http://schemas.microsoft.com/office/drawing/2010/main" xmlns="" w="9525">
                     <a:solidFill>
                       <a:srgbClr val="000000"/>
                     </a:solidFill>
@@ -23960,7 +23961,7 @@
               </a:ln>
               <a:extLst>
                 <a:ext uri="{91240B29-F687-4f45-9708-019B960494DF}">
-                  <a14:hiddenLine xmlns="" xmlns:a14="http://schemas.microsoft.com/office/drawing/2010/main" w="9525">
+                  <a14:hiddenLine xmlns:a14="http://schemas.microsoft.com/office/drawing/2010/main" xmlns="" w="9525">
                     <a:solidFill>
                       <a:srgbClr val="000000"/>
                     </a:solidFill>
@@ -24100,7 +24101,7 @@
           <a:p>
             <a:fld id="{52C02C3A-F3EC-431D-BD4C-85B7465FC644}" type="datetimeFigureOut">
               <a:rPr lang="en-IL" smtClean="0"/>
-              <a:t>05/08/2024</a:t>
+              <a:t>23/11/2024</a:t>
             </a:fld>
             <a:endParaRPr lang="en-IL"/>
           </a:p>
@@ -25719,6 +25720,130 @@
           <p:cNvPr id="2" name="Title 1">
             <a:extLst>
               <a:ext uri="{FF2B5EF4-FFF2-40B4-BE49-F238E27FC236}">
+                <a16:creationId xmlns:a16="http://schemas.microsoft.com/office/drawing/2014/main" id="{98D2D7EE-BDFD-649D-9355-C4B9733EBF88}"/>
+              </a:ext>
+            </a:extLst>
+          </p:cNvPr>
+          <p:cNvSpPr>
+            <a:spLocks noGrp="1"/>
+          </p:cNvSpPr>
+          <p:nvPr>
+            <p:ph type="title"/>
+          </p:nvPr>
+        </p:nvSpPr>
+        <p:spPr/>
+        <p:txBody>
+          <a:bodyPr/>
+          <a:lstStyle/>
+          <a:p>
+            <a:r>
+              <a:rPr lang="en-US" dirty="0"/>
+              <a:t>Display </a:t>
+            </a:r>
+            <a:endParaRPr lang="en-IL" dirty="0"/>
+          </a:p>
+        </p:txBody>
+      </p:sp>
+      <p:sp>
+        <p:nvSpPr>
+          <p:cNvPr id="3" name="Content Placeholder 2">
+            <a:extLst>
+              <a:ext uri="{FF2B5EF4-FFF2-40B4-BE49-F238E27FC236}">
+                <a16:creationId xmlns:a16="http://schemas.microsoft.com/office/drawing/2014/main" id="{CACF9BC0-DADD-EEEA-06BC-EDBF343A937A}"/>
+              </a:ext>
+            </a:extLst>
+          </p:cNvPr>
+          <p:cNvSpPr>
+            <a:spLocks noGrp="1"/>
+          </p:cNvSpPr>
+          <p:nvPr>
+            <p:ph idx="1"/>
+          </p:nvPr>
+        </p:nvSpPr>
+        <p:spPr>
+          <a:xfrm>
+            <a:off x="1141412" y="1792224"/>
+            <a:ext cx="9905999" cy="4901184"/>
+          </a:xfrm>
+        </p:spPr>
+        <p:txBody>
+          <a:bodyPr>
+            <a:normAutofit/>
+          </a:bodyPr>
+          <a:lstStyle/>
+          <a:p>
+            <a:r>
+              <a:rPr lang="en-US" dirty="0"/>
+              <a:t>3.2 inch.</a:t>
+            </a:r>
+          </a:p>
+          <a:p>
+            <a:endParaRPr lang="en-US" dirty="0"/>
+          </a:p>
+          <a:p>
+            <a:r>
+              <a:rPr lang="en-US" dirty="0"/>
+              <a:t>240X320 pixels.</a:t>
+            </a:r>
+          </a:p>
+          <a:p>
+            <a:endParaRPr lang="en-US" dirty="0"/>
+          </a:p>
+          <a:p>
+            <a:r>
+              <a:rPr lang="en-US" dirty="0"/>
+              <a:t>Supports Arduino development Environment. </a:t>
+            </a:r>
+          </a:p>
+          <a:p>
+            <a:endParaRPr lang="en-US" dirty="0"/>
+          </a:p>
+          <a:p>
+            <a:r>
+              <a:rPr lang="en-US" dirty="0"/>
+              <a:t> Can be powered with 3.3V.</a:t>
+            </a:r>
+          </a:p>
+          <a:p>
+            <a:endParaRPr lang="en-US" dirty="0"/>
+          </a:p>
+        </p:txBody>
+      </p:sp>
+    </p:spTree>
+    <p:extLst>
+      <p:ext uri="{BB962C8B-B14F-4D97-AF65-F5344CB8AC3E}">
+        <p14:creationId xmlns:p14="http://schemas.microsoft.com/office/powerpoint/2010/main" val="2521807684"/>
+      </p:ext>
+    </p:extLst>
+  </p:cSld>
+  <p:clrMapOvr>
+    <a:masterClrMapping/>
+  </p:clrMapOvr>
+</p:sld>
+</file>
+
+<file path=ppt/slides/slide14.xml><?xml version="1.0" encoding="utf-8"?>
+<p:sld xmlns:a="http://schemas.openxmlformats.org/drawingml/2006/main" xmlns:r="http://schemas.openxmlformats.org/officeDocument/2006/relationships" xmlns:p="http://schemas.openxmlformats.org/presentationml/2006/main">
+  <p:cSld>
+    <p:spTree>
+      <p:nvGrpSpPr>
+        <p:cNvPr id="1" name=""/>
+        <p:cNvGrpSpPr/>
+        <p:nvPr/>
+      </p:nvGrpSpPr>
+      <p:grpSpPr>
+        <a:xfrm>
+          <a:off x="0" y="0"/>
+          <a:ext cx="0" cy="0"/>
+          <a:chOff x="0" y="0"/>
+          <a:chExt cx="0" cy="0"/>
+        </a:xfrm>
+      </p:grpSpPr>
+      <p:sp>
+        <p:nvSpPr>
+          <p:cNvPr id="2" name="Title 1">
+            <a:extLst>
+              <a:ext uri="{FF2B5EF4-FFF2-40B4-BE49-F238E27FC236}">
                 <a16:creationId xmlns:a16="http://schemas.microsoft.com/office/drawing/2014/main" id="{E251417E-E7E4-488F-8BAD-86DAD297F00A}"/>
               </a:ext>
             </a:extLst>
@@ -25896,7 +26021,7 @@
 </p:sld>
 </file>
 
-<file path=ppt/slides/slide14.xml><?xml version="1.0" encoding="utf-8"?>
+<file path=ppt/slides/slide15.xml><?xml version="1.0" encoding="utf-8"?>
 <p:sld xmlns:a="http://schemas.openxmlformats.org/drawingml/2006/main" xmlns:r="http://schemas.openxmlformats.org/officeDocument/2006/relationships" xmlns:p="http://schemas.openxmlformats.org/presentationml/2006/main">
   <p:cSld>
     <p:spTree>
@@ -27061,7 +27186,7 @@
 </p:sld>
 </file>
 
-<file path=ppt/slides/slide15.xml><?xml version="1.0" encoding="utf-8"?>
+<file path=ppt/slides/slide16.xml><?xml version="1.0" encoding="utf-8"?>
 <p:sld xmlns:a="http://schemas.openxmlformats.org/drawingml/2006/main" xmlns:r="http://schemas.openxmlformats.org/officeDocument/2006/relationships" xmlns:p="http://schemas.openxmlformats.org/presentationml/2006/main">
   <p:cSld>
     <p:spTree>

</xml_diff>